<commit_message>
Updates for factorial and sets lecture content.
Signed-off-by: Charlie Murphy <tm507211@ohio.edu>
</commit_message>
<xml_diff>
--- a/courses/csci246/spring26/slides/02_02_26_lists.pptx
+++ b/courses/csci246/spring26/slides/02_02_26_lists.pptx
@@ -203,7 +203,7 @@
           <a:p>
             <a:fld id="{B7930911-D214-D045-9349-C37725674895}" type="datetimeFigureOut">
               <a:rPr lang="en-US" smtClean="0"/>
-              <a:t>2/2/26</a:t>
+              <a:t>2/6/26</a:t>
             </a:fld>
             <a:endParaRPr lang="en-US"/>
           </a:p>
@@ -617,7 +617,7 @@
           <a:p>
             <a:fld id="{05900130-2E42-9F4E-B9EA-739EF1E7DBD9}" type="datetimeFigureOut">
               <a:rPr lang="en-US" smtClean="0"/>
-              <a:t>2/2/26</a:t>
+              <a:t>2/6/26</a:t>
             </a:fld>
             <a:endParaRPr lang="en-US"/>
           </a:p>
@@ -815,7 +815,7 @@
           <a:p>
             <a:fld id="{05900130-2E42-9F4E-B9EA-739EF1E7DBD9}" type="datetimeFigureOut">
               <a:rPr lang="en-US" smtClean="0"/>
-              <a:t>2/2/26</a:t>
+              <a:t>2/6/26</a:t>
             </a:fld>
             <a:endParaRPr lang="en-US"/>
           </a:p>
@@ -1023,7 +1023,7 @@
           <a:p>
             <a:fld id="{05900130-2E42-9F4E-B9EA-739EF1E7DBD9}" type="datetimeFigureOut">
               <a:rPr lang="en-US" smtClean="0"/>
-              <a:t>2/2/26</a:t>
+              <a:t>2/6/26</a:t>
             </a:fld>
             <a:endParaRPr lang="en-US"/>
           </a:p>
@@ -1221,7 +1221,7 @@
           <a:p>
             <a:fld id="{05900130-2E42-9F4E-B9EA-739EF1E7DBD9}" type="datetimeFigureOut">
               <a:rPr lang="en-US" smtClean="0"/>
-              <a:t>2/2/26</a:t>
+              <a:t>2/6/26</a:t>
             </a:fld>
             <a:endParaRPr lang="en-US"/>
           </a:p>
@@ -1496,7 +1496,7 @@
           <a:p>
             <a:fld id="{05900130-2E42-9F4E-B9EA-739EF1E7DBD9}" type="datetimeFigureOut">
               <a:rPr lang="en-US" smtClean="0"/>
-              <a:t>2/2/26</a:t>
+              <a:t>2/6/26</a:t>
             </a:fld>
             <a:endParaRPr lang="en-US"/>
           </a:p>
@@ -1761,7 +1761,7 @@
           <a:p>
             <a:fld id="{05900130-2E42-9F4E-B9EA-739EF1E7DBD9}" type="datetimeFigureOut">
               <a:rPr lang="en-US" smtClean="0"/>
-              <a:t>2/2/26</a:t>
+              <a:t>2/6/26</a:t>
             </a:fld>
             <a:endParaRPr lang="en-US"/>
           </a:p>
@@ -2173,7 +2173,7 @@
           <a:p>
             <a:fld id="{05900130-2E42-9F4E-B9EA-739EF1E7DBD9}" type="datetimeFigureOut">
               <a:rPr lang="en-US" smtClean="0"/>
-              <a:t>2/2/26</a:t>
+              <a:t>2/6/26</a:t>
             </a:fld>
             <a:endParaRPr lang="en-US"/>
           </a:p>
@@ -2314,7 +2314,7 @@
           <a:p>
             <a:fld id="{05900130-2E42-9F4E-B9EA-739EF1E7DBD9}" type="datetimeFigureOut">
               <a:rPr lang="en-US" smtClean="0"/>
-              <a:t>2/2/26</a:t>
+              <a:t>2/6/26</a:t>
             </a:fld>
             <a:endParaRPr lang="en-US"/>
           </a:p>
@@ -2427,7 +2427,7 @@
           <a:p>
             <a:fld id="{05900130-2E42-9F4E-B9EA-739EF1E7DBD9}" type="datetimeFigureOut">
               <a:rPr lang="en-US" smtClean="0"/>
-              <a:t>2/2/26</a:t>
+              <a:t>2/6/26</a:t>
             </a:fld>
             <a:endParaRPr lang="en-US"/>
           </a:p>
@@ -2738,7 +2738,7 @@
           <a:p>
             <a:fld id="{05900130-2E42-9F4E-B9EA-739EF1E7DBD9}" type="datetimeFigureOut">
               <a:rPr lang="en-US" smtClean="0"/>
-              <a:t>2/2/26</a:t>
+              <a:t>2/6/26</a:t>
             </a:fld>
             <a:endParaRPr lang="en-US"/>
           </a:p>
@@ -3026,7 +3026,7 @@
           <a:p>
             <a:fld id="{05900130-2E42-9F4E-B9EA-739EF1E7DBD9}" type="datetimeFigureOut">
               <a:rPr lang="en-US" smtClean="0"/>
-              <a:t>2/2/26</a:t>
+              <a:t>2/6/26</a:t>
             </a:fld>
             <a:endParaRPr lang="en-US"/>
           </a:p>
@@ -3267,7 +3267,7 @@
           <a:p>
             <a:fld id="{05900130-2E42-9F4E-B9EA-739EF1E7DBD9}" type="datetimeFigureOut">
               <a:rPr lang="en-US" smtClean="0"/>
-              <a:t>2/2/26</a:t>
+              <a:t>2/6/26</a:t>
             </a:fld>
             <a:endParaRPr lang="en-US"/>
           </a:p>
@@ -3782,8 +3782,19 @@
                 <a:latin typeface="Arial" panose="020B0604020202020204" pitchFamily="34" charset="0"/>
                 <a:cs typeface="Arial" panose="020B0604020202020204" pitchFamily="34" charset="0"/>
               </a:rPr>
-              <a:t>Textbook Reference: Ch 2. Sec 9</a:t>
+              <a:t>Textbook Reference: Ch 2. </a:t>
             </a:r>
+            <a:r>
+              <a:rPr lang="en-US">
+                <a:latin typeface="Arial" panose="020B0604020202020204" pitchFamily="34" charset="0"/>
+                <a:cs typeface="Arial" panose="020B0604020202020204" pitchFamily="34" charset="0"/>
+              </a:rPr>
+              <a:t>Sec 8</a:t>
+            </a:r>
+            <a:endParaRPr lang="en-US" dirty="0">
+              <a:latin typeface="Arial" panose="020B0604020202020204" pitchFamily="34" charset="0"/>
+              <a:cs typeface="Arial" panose="020B0604020202020204" pitchFamily="34" charset="0"/>
+            </a:endParaRPr>
           </a:p>
         </p:txBody>
       </p:sp>
@@ -3993,8 +4004,8 @@
           </a:p>
         </p:txBody>
       </p:sp>
-      <mc:AlternateContent xmlns:mc="http://schemas.openxmlformats.org/markup-compatibility/2006">
-        <mc:Choice xmlns:a14="http://schemas.microsoft.com/office/drawing/2010/main" Requires="a14">
+      <mc:AlternateContent xmlns:mc="http://schemas.openxmlformats.org/markup-compatibility/2006" xmlns:a14="http://schemas.microsoft.com/office/drawing/2010/main">
+        <mc:Choice Requires="a14">
           <p:sp>
             <p:nvSpPr>
               <p:cNvPr id="3" name="Content Placeholder 2">
@@ -4302,7 +4313,7 @@
             </p:txBody>
           </p:sp>
         </mc:Choice>
-        <mc:Fallback>
+        <mc:Fallback xmlns="">
           <p:sp>
             <p:nvSpPr>
               <p:cNvPr id="3" name="Content Placeholder 2">
@@ -5327,8 +5338,8 @@
           </a:p>
         </p:txBody>
       </p:sp>
-      <mc:AlternateContent xmlns:mc="http://schemas.openxmlformats.org/markup-compatibility/2006">
-        <mc:Choice xmlns:a14="http://schemas.microsoft.com/office/drawing/2010/main" Requires="a14">
+      <mc:AlternateContent xmlns:mc="http://schemas.openxmlformats.org/markup-compatibility/2006" xmlns:a14="http://schemas.microsoft.com/office/drawing/2010/main">
+        <mc:Choice Requires="a14">
           <p:sp>
             <p:nvSpPr>
               <p:cNvPr id="3" name="Content Placeholder 2">
@@ -5443,7 +5454,7 @@
             </p:txBody>
           </p:sp>
         </mc:Choice>
-        <mc:Fallback>
+        <mc:Fallback xmlns="">
           <p:sp>
             <p:nvSpPr>
               <p:cNvPr id="3" name="Content Placeholder 2">
@@ -5487,8 +5498,8 @@
           </p:sp>
         </mc:Fallback>
       </mc:AlternateContent>
-      <mc:AlternateContent xmlns:mc="http://schemas.openxmlformats.org/markup-compatibility/2006">
-        <mc:Choice xmlns:a14="http://schemas.microsoft.com/office/drawing/2010/main" Requires="a14">
+      <mc:AlternateContent xmlns:mc="http://schemas.openxmlformats.org/markup-compatibility/2006" xmlns:a14="http://schemas.microsoft.com/office/drawing/2010/main">
+        <mc:Choice Requires="a14">
           <p:sp>
             <p:nvSpPr>
               <p:cNvPr id="4" name="TextBox 3">
@@ -5538,7 +5549,7 @@
             </p:txBody>
           </p:sp>
         </mc:Choice>
-        <mc:Fallback>
+        <mc:Fallback xmlns="">
           <p:sp>
             <p:nvSpPr>
               <p:cNvPr id="4" name="TextBox 3">
@@ -5583,8 +5594,8 @@
           </p:sp>
         </mc:Fallback>
       </mc:AlternateContent>
-      <mc:AlternateContent xmlns:mc="http://schemas.openxmlformats.org/markup-compatibility/2006">
-        <mc:Choice xmlns:a14="http://schemas.microsoft.com/office/drawing/2010/main" Requires="a14">
+      <mc:AlternateContent xmlns:mc="http://schemas.openxmlformats.org/markup-compatibility/2006" xmlns:a14="http://schemas.microsoft.com/office/drawing/2010/main">
+        <mc:Choice Requires="a14">
           <p:sp>
             <p:nvSpPr>
               <p:cNvPr id="6" name="TextBox 5">
@@ -5691,7 +5702,7 @@
             </p:txBody>
           </p:sp>
         </mc:Choice>
-        <mc:Fallback>
+        <mc:Fallback xmlns="">
           <p:sp>
             <p:nvSpPr>
               <p:cNvPr id="6" name="TextBox 5">
@@ -5736,8 +5747,8 @@
           </p:sp>
         </mc:Fallback>
       </mc:AlternateContent>
-      <mc:AlternateContent xmlns:mc="http://schemas.openxmlformats.org/markup-compatibility/2006">
-        <mc:Choice xmlns:a14="http://schemas.microsoft.com/office/drawing/2010/main" Requires="a14">
+      <mc:AlternateContent xmlns:mc="http://schemas.openxmlformats.org/markup-compatibility/2006" xmlns:a14="http://schemas.microsoft.com/office/drawing/2010/main">
+        <mc:Choice Requires="a14">
           <p:sp>
             <p:nvSpPr>
               <p:cNvPr id="7" name="TextBox 6">
@@ -6094,7 +6105,7 @@
             </p:txBody>
           </p:sp>
         </mc:Choice>
-        <mc:Fallback>
+        <mc:Fallback xmlns="">
           <p:sp>
             <p:nvSpPr>
               <p:cNvPr id="7" name="TextBox 6">
@@ -6139,8 +6150,8 @@
           </p:sp>
         </mc:Fallback>
       </mc:AlternateContent>
-      <mc:AlternateContent xmlns:mc="http://schemas.openxmlformats.org/markup-compatibility/2006">
-        <mc:Choice xmlns:a14="http://schemas.microsoft.com/office/drawing/2010/main" Requires="a14">
+      <mc:AlternateContent xmlns:mc="http://schemas.openxmlformats.org/markup-compatibility/2006" xmlns:a14="http://schemas.microsoft.com/office/drawing/2010/main">
+        <mc:Choice Requires="a14">
           <p:sp>
             <p:nvSpPr>
               <p:cNvPr id="8" name="TextBox 7">
@@ -6605,7 +6616,7 @@
             </p:txBody>
           </p:sp>
         </mc:Choice>
-        <mc:Fallback>
+        <mc:Fallback xmlns="">
           <p:sp>
             <p:nvSpPr>
               <p:cNvPr id="8" name="TextBox 7">
@@ -6650,8 +6661,8 @@
           </p:sp>
         </mc:Fallback>
       </mc:AlternateContent>
-      <mc:AlternateContent xmlns:mc="http://schemas.openxmlformats.org/markup-compatibility/2006">
-        <mc:Choice xmlns:a14="http://schemas.microsoft.com/office/drawing/2010/main" Requires="a14">
+      <mc:AlternateContent xmlns:mc="http://schemas.openxmlformats.org/markup-compatibility/2006" xmlns:a14="http://schemas.microsoft.com/office/drawing/2010/main">
+        <mc:Choice Requires="a14">
           <p:sp>
             <p:nvSpPr>
               <p:cNvPr id="9" name="TextBox 8">
@@ -7116,7 +7127,7 @@
             </p:txBody>
           </p:sp>
         </mc:Choice>
-        <mc:Fallback>
+        <mc:Fallback xmlns="">
           <p:sp>
             <p:nvSpPr>
               <p:cNvPr id="9" name="TextBox 8">
@@ -7161,8 +7172,8 @@
           </p:sp>
         </mc:Fallback>
       </mc:AlternateContent>
-      <mc:AlternateContent xmlns:mc="http://schemas.openxmlformats.org/markup-compatibility/2006">
-        <mc:Choice xmlns:a14="http://schemas.microsoft.com/office/drawing/2010/main" Requires="a14">
+      <mc:AlternateContent xmlns:mc="http://schemas.openxmlformats.org/markup-compatibility/2006" xmlns:a14="http://schemas.microsoft.com/office/drawing/2010/main">
+        <mc:Choice Requires="a14">
           <p:sp>
             <p:nvSpPr>
               <p:cNvPr id="10" name="TextBox 9">
@@ -7627,7 +7638,7 @@
             </p:txBody>
           </p:sp>
         </mc:Choice>
-        <mc:Fallback>
+        <mc:Fallback xmlns="">
           <p:sp>
             <p:nvSpPr>
               <p:cNvPr id="10" name="TextBox 9">
@@ -8269,8 +8280,8 @@
           </a:p>
         </p:txBody>
       </p:sp>
-      <mc:AlternateContent xmlns:mc="http://schemas.openxmlformats.org/markup-compatibility/2006">
-        <mc:Choice xmlns:a14="http://schemas.microsoft.com/office/drawing/2010/main" Requires="a14">
+      <mc:AlternateContent xmlns:mc="http://schemas.openxmlformats.org/markup-compatibility/2006" xmlns:a14="http://schemas.microsoft.com/office/drawing/2010/main">
+        <mc:Choice Requires="a14">
           <p:sp>
             <p:nvSpPr>
               <p:cNvPr id="3" name="Content Placeholder 2">
@@ -8424,7 +8435,7 @@
             </p:txBody>
           </p:sp>
         </mc:Choice>
-        <mc:Fallback>
+        <mc:Fallback xmlns="">
           <p:sp>
             <p:nvSpPr>
               <p:cNvPr id="3" name="Content Placeholder 2">
@@ -8525,8 +8536,8 @@
           </a:p>
         </p:txBody>
       </p:sp>
-      <mc:AlternateContent xmlns:mc="http://schemas.openxmlformats.org/markup-compatibility/2006">
-        <mc:Choice xmlns:a14="http://schemas.microsoft.com/office/drawing/2010/main" Requires="a14">
+      <mc:AlternateContent xmlns:mc="http://schemas.openxmlformats.org/markup-compatibility/2006" xmlns:a14="http://schemas.microsoft.com/office/drawing/2010/main">
+        <mc:Choice Requires="a14">
           <p:sp>
             <p:nvSpPr>
               <p:cNvPr id="3" name="Content Placeholder 2">
@@ -8963,7 +8974,7 @@
             </p:txBody>
           </p:sp>
         </mc:Choice>
-        <mc:Fallback>
+        <mc:Fallback xmlns="">
           <p:sp>
             <p:nvSpPr>
               <p:cNvPr id="3" name="Content Placeholder 2">
@@ -9003,8 +9014,8 @@
           </p:sp>
         </mc:Fallback>
       </mc:AlternateContent>
-      <mc:AlternateContent xmlns:mc="http://schemas.openxmlformats.org/markup-compatibility/2006">
-        <mc:Choice xmlns:a14="http://schemas.microsoft.com/office/drawing/2010/main" Requires="a14">
+      <mc:AlternateContent xmlns:mc="http://schemas.openxmlformats.org/markup-compatibility/2006" xmlns:a14="http://schemas.microsoft.com/office/drawing/2010/main">
+        <mc:Choice Requires="a14">
           <p:sp>
             <p:nvSpPr>
               <p:cNvPr id="5" name="TextBox 4">
@@ -9177,21 +9188,7 @@
                           <a:latin typeface="Cambria Math" panose="02040503050406030204" pitchFamily="18" charset="0"/>
                           <a:cs typeface="Arial" panose="020B0604020202020204" pitchFamily="34" charset="0"/>
                         </a:rPr>
-                        <m:t> </m:t>
-                      </m:r>
-                      <m:r>
-                        <a:rPr lang="en-US" sz="2400" b="0" i="0" dirty="0" smtClean="0">
-                          <a:latin typeface="Cambria Math" panose="02040503050406030204" pitchFamily="18" charset="0"/>
-                          <a:cs typeface="Arial" panose="020B0604020202020204" pitchFamily="34" charset="0"/>
-                        </a:rPr>
-                        <m:t> </m:t>
-                      </m:r>
-                      <m:r>
-                        <a:rPr lang="en-US" sz="2400" b="0" i="0" dirty="0" smtClean="0">
-                          <a:latin typeface="Cambria Math" panose="02040503050406030204" pitchFamily="18" charset="0"/>
-                          <a:cs typeface="Arial" panose="020B0604020202020204" pitchFamily="34" charset="0"/>
-                        </a:rPr>
-                        <m:t>(</m:t>
+                        <m:t>  (</m:t>
                       </m:r>
                       <m:r>
                         <m:rPr>
@@ -9324,7 +9321,7 @@
             </p:txBody>
           </p:sp>
         </mc:Choice>
-        <mc:Fallback>
+        <mc:Fallback xmlns="">
           <p:sp>
             <p:nvSpPr>
               <p:cNvPr id="5" name="TextBox 4">
@@ -9369,8 +9366,8 @@
           </p:sp>
         </mc:Fallback>
       </mc:AlternateContent>
-      <mc:AlternateContent xmlns:mc="http://schemas.openxmlformats.org/markup-compatibility/2006">
-        <mc:Choice xmlns:a14="http://schemas.microsoft.com/office/drawing/2010/main" Requires="a14">
+      <mc:AlternateContent xmlns:mc="http://schemas.openxmlformats.org/markup-compatibility/2006" xmlns:a14="http://schemas.microsoft.com/office/drawing/2010/main">
+        <mc:Choice Requires="a14">
           <p:sp>
             <p:nvSpPr>
               <p:cNvPr id="6" name="TextBox 5">
@@ -9515,7 +9512,7 @@
             </p:txBody>
           </p:sp>
         </mc:Choice>
-        <mc:Fallback>
+        <mc:Fallback xmlns="">
           <p:sp>
             <p:nvSpPr>
               <p:cNvPr id="6" name="TextBox 5">
@@ -9560,8 +9557,8 @@
           </p:sp>
         </mc:Fallback>
       </mc:AlternateContent>
-      <mc:AlternateContent xmlns:mc="http://schemas.openxmlformats.org/markup-compatibility/2006">
-        <mc:Choice xmlns:a14="http://schemas.microsoft.com/office/drawing/2010/main" Requires="a14">
+      <mc:AlternateContent xmlns:mc="http://schemas.openxmlformats.org/markup-compatibility/2006" xmlns:a14="http://schemas.microsoft.com/office/drawing/2010/main">
+        <mc:Choice Requires="a14">
           <p:sp>
             <p:nvSpPr>
               <p:cNvPr id="7" name="TextBox 6">
@@ -9779,19 +9776,12 @@
                           <a:latin typeface="Cambria Math" panose="02040503050406030204" pitchFamily="18" charset="0"/>
                           <a:cs typeface="Arial" panose="020B0604020202020204" pitchFamily="34" charset="0"/>
                         </a:rPr>
-                        <m:t> </m:t>
-                      </m:r>
-                      <m:r>
-                        <a:rPr lang="en-US" sz="2400" b="0" i="0" dirty="0" smtClean="0">
-                          <a:latin typeface="Cambria Math" panose="02040503050406030204" pitchFamily="18" charset="0"/>
-                          <a:cs typeface="Arial" panose="020B0604020202020204" pitchFamily="34" charset="0"/>
-                        </a:rPr>
-                        <m:t>  </m:t>
+                        <m:t>   </m:t>
                       </m:r>
                       <m:d>
                         <m:dPr>
                           <m:ctrlPr>
-                            <a:rPr lang="en-US" sz="2400" b="0" i="0" dirty="0" smtClean="0">
+                            <a:rPr lang="en-US" sz="2400" b="0" i="1" dirty="0" smtClean="0">
                               <a:latin typeface="Cambria Math" panose="02040503050406030204" pitchFamily="18" charset="0"/>
                               <a:cs typeface="Arial" panose="020B0604020202020204" pitchFamily="34" charset="0"/>
                             </a:rPr>
@@ -9974,7 +9964,7 @@
             </p:txBody>
           </p:sp>
         </mc:Choice>
-        <mc:Fallback>
+        <mc:Fallback xmlns="">
           <p:sp>
             <p:nvSpPr>
               <p:cNvPr id="7" name="TextBox 6">
@@ -10019,8 +10009,8 @@
           </p:sp>
         </mc:Fallback>
       </mc:AlternateContent>
-      <mc:AlternateContent xmlns:mc="http://schemas.openxmlformats.org/markup-compatibility/2006">
-        <mc:Choice xmlns:a14="http://schemas.microsoft.com/office/drawing/2010/main" Requires="a14">
+      <mc:AlternateContent xmlns:mc="http://schemas.openxmlformats.org/markup-compatibility/2006" xmlns:a14="http://schemas.microsoft.com/office/drawing/2010/main">
+        <mc:Choice Requires="a14">
           <p:sp>
             <p:nvSpPr>
               <p:cNvPr id="9" name="TextBox 8">
@@ -10071,7 +10061,7 @@
             </p:txBody>
           </p:sp>
         </mc:Choice>
-        <mc:Fallback>
+        <mc:Fallback xmlns="">
           <p:sp>
             <p:nvSpPr>
               <p:cNvPr id="9" name="TextBox 8">

</xml_diff>